<commit_message>
Update DB : HDF5 + MongoDB => PostgreSQL
</commit_message>
<xml_diff>
--- a/docs/architecture/Archi Algo Cryptos.pptx
+++ b/docs/architecture/Archi Algo Cryptos.pptx
@@ -200,7 +200,7 @@
           <a:p>
             <a:fld id="{1BB928A9-062B-46CD-98A0-018DEAA9747D}" type="datetimeFigureOut">
               <a:rPr lang="fr-FR" smtClean="0"/>
-              <a:t>27/12/2017</a:t>
+              <a:t>01/01/2018</a:t>
             </a:fld>
             <a:endParaRPr lang="fr-FR"/>
           </a:p>
@@ -414,7 +414,7 @@
           <a:p>
             <a:fld id="{3A7A33AD-86CD-4B18-A016-0BEA370C4403}" type="datetimeFigureOut">
               <a:rPr lang="fr-FR" smtClean="0"/>
-              <a:t>27/12/2017</a:t>
+              <a:t>01/01/2018</a:t>
             </a:fld>
             <a:endParaRPr lang="fr-FR"/>
           </a:p>
@@ -584,7 +584,7 @@
           <a:p>
             <a:fld id="{3A7A33AD-86CD-4B18-A016-0BEA370C4403}" type="datetimeFigureOut">
               <a:rPr lang="fr-FR" smtClean="0"/>
-              <a:t>27/12/2017</a:t>
+              <a:t>01/01/2018</a:t>
             </a:fld>
             <a:endParaRPr lang="fr-FR"/>
           </a:p>
@@ -764,7 +764,7 @@
           <a:p>
             <a:fld id="{3A7A33AD-86CD-4B18-A016-0BEA370C4403}" type="datetimeFigureOut">
               <a:rPr lang="fr-FR" smtClean="0"/>
-              <a:t>27/12/2017</a:t>
+              <a:t>01/01/2018</a:t>
             </a:fld>
             <a:endParaRPr lang="fr-FR"/>
           </a:p>
@@ -934,7 +934,7 @@
           <a:p>
             <a:fld id="{3A7A33AD-86CD-4B18-A016-0BEA370C4403}" type="datetimeFigureOut">
               <a:rPr lang="fr-FR" smtClean="0"/>
-              <a:t>27/12/2017</a:t>
+              <a:t>01/01/2018</a:t>
             </a:fld>
             <a:endParaRPr lang="fr-FR"/>
           </a:p>
@@ -1178,7 +1178,7 @@
           <a:p>
             <a:fld id="{3A7A33AD-86CD-4B18-A016-0BEA370C4403}" type="datetimeFigureOut">
               <a:rPr lang="fr-FR" smtClean="0"/>
-              <a:t>27/12/2017</a:t>
+              <a:t>01/01/2018</a:t>
             </a:fld>
             <a:endParaRPr lang="fr-FR"/>
           </a:p>
@@ -1410,7 +1410,7 @@
           <a:p>
             <a:fld id="{3A7A33AD-86CD-4B18-A016-0BEA370C4403}" type="datetimeFigureOut">
               <a:rPr lang="fr-FR" smtClean="0"/>
-              <a:t>27/12/2017</a:t>
+              <a:t>01/01/2018</a:t>
             </a:fld>
             <a:endParaRPr lang="fr-FR"/>
           </a:p>
@@ -1777,7 +1777,7 @@
           <a:p>
             <a:fld id="{3A7A33AD-86CD-4B18-A016-0BEA370C4403}" type="datetimeFigureOut">
               <a:rPr lang="fr-FR" smtClean="0"/>
-              <a:t>27/12/2017</a:t>
+              <a:t>01/01/2018</a:t>
             </a:fld>
             <a:endParaRPr lang="fr-FR"/>
           </a:p>
@@ -1895,7 +1895,7 @@
           <a:p>
             <a:fld id="{3A7A33AD-86CD-4B18-A016-0BEA370C4403}" type="datetimeFigureOut">
               <a:rPr lang="fr-FR" smtClean="0"/>
-              <a:t>27/12/2017</a:t>
+              <a:t>01/01/2018</a:t>
             </a:fld>
             <a:endParaRPr lang="fr-FR"/>
           </a:p>
@@ -1990,7 +1990,7 @@
           <a:p>
             <a:fld id="{3A7A33AD-86CD-4B18-A016-0BEA370C4403}" type="datetimeFigureOut">
               <a:rPr lang="fr-FR" smtClean="0"/>
-              <a:t>27/12/2017</a:t>
+              <a:t>01/01/2018</a:t>
             </a:fld>
             <a:endParaRPr lang="fr-FR"/>
           </a:p>
@@ -2267,7 +2267,7 @@
           <a:p>
             <a:fld id="{3A7A33AD-86CD-4B18-A016-0BEA370C4403}" type="datetimeFigureOut">
               <a:rPr lang="fr-FR" smtClean="0"/>
-              <a:t>27/12/2017</a:t>
+              <a:t>01/01/2018</a:t>
             </a:fld>
             <a:endParaRPr lang="fr-FR"/>
           </a:p>
@@ -2524,7 +2524,7 @@
           <a:p>
             <a:fld id="{3A7A33AD-86CD-4B18-A016-0BEA370C4403}" type="datetimeFigureOut">
               <a:rPr lang="fr-FR" smtClean="0"/>
-              <a:t>27/12/2017</a:t>
+              <a:t>01/01/2018</a:t>
             </a:fld>
             <a:endParaRPr lang="fr-FR"/>
           </a:p>
@@ -2737,7 +2737,7 @@
           <a:p>
             <a:fld id="{3A7A33AD-86CD-4B18-A016-0BEA370C4403}" type="datetimeFigureOut">
               <a:rPr lang="fr-FR" smtClean="0"/>
-              <a:t>27/12/2017</a:t>
+              <a:t>01/01/2018</a:t>
             </a:fld>
             <a:endParaRPr lang="fr-FR"/>
           </a:p>
@@ -3907,54 +3907,6 @@
           </a:fontRef>
         </p:style>
       </p:cxnSp>
-      <p:sp>
-        <p:nvSpPr>
-          <p:cNvPr id="34" name="Cylindre 33"/>
-          <p:cNvSpPr/>
-          <p:nvPr/>
-        </p:nvSpPr>
-        <p:spPr>
-          <a:xfrm>
-            <a:off x="9140511" y="5162180"/>
-            <a:ext cx="1348816" cy="1292023"/>
-          </a:xfrm>
-          <a:prstGeom prst="can">
-            <a:avLst/>
-          </a:prstGeom>
-        </p:spPr>
-        <p:style>
-          <a:lnRef idx="2">
-            <a:schemeClr val="accent1">
-              <a:shade val="50000"/>
-            </a:schemeClr>
-          </a:lnRef>
-          <a:fillRef idx="1">
-            <a:schemeClr val="accent1"/>
-          </a:fillRef>
-          <a:effectRef idx="0">
-            <a:schemeClr val="accent1"/>
-          </a:effectRef>
-          <a:fontRef idx="minor">
-            <a:schemeClr val="lt1"/>
-          </a:fontRef>
-        </p:style>
-        <p:txBody>
-          <a:bodyPr rot="0" spcFirstLastPara="0" vertOverflow="overflow" horzOverflow="overflow" vert="horz" wrap="square" lIns="100806" tIns="50403" rIns="100806" bIns="50403" numCol="1" spcCol="0" rtlCol="0" fromWordArt="0" anchor="ctr" anchorCtr="0" forceAA="0" compatLnSpc="1">
-            <a:prstTxWarp prst="textNoShape">
-              <a:avLst/>
-            </a:prstTxWarp>
-            <a:noAutofit/>
-          </a:bodyPr>
-          <a:lstStyle/>
-          <a:p>
-            <a:pPr algn="ctr"/>
-            <a:r>
-              <a:rPr lang="fr-FR" sz="2334" dirty="0"/>
-              <a:t>DB</a:t>
-            </a:r>
-          </a:p>
-        </p:txBody>
-      </p:sp>
       <p:pic>
         <p:nvPicPr>
           <p:cNvPr id="1034" name="Picture 10" descr="http://1tenhost.com/wp-content/uploads/2017/09/Python-Logo-PNG-Image.png"/>
@@ -3996,91 +3948,6 @@
           </a:extLst>
         </p:spPr>
       </p:pic>
-      <p:grpSp>
-        <p:nvGrpSpPr>
-          <p:cNvPr id="38" name="Groupe 37"/>
-          <p:cNvGrpSpPr/>
-          <p:nvPr/>
-        </p:nvGrpSpPr>
-        <p:grpSpPr>
-          <a:xfrm>
-            <a:off x="10304759" y="5005916"/>
-            <a:ext cx="1066089" cy="499495"/>
-            <a:chOff x="8912188" y="4363617"/>
-            <a:chExt cx="967035" cy="453085"/>
-          </a:xfrm>
-        </p:grpSpPr>
-        <p:pic>
-          <p:nvPicPr>
-            <p:cNvPr id="1036" name="Picture 12" descr="Résultat de recherche d'images pour &quot;HDF5 logo&quot;"/>
-            <p:cNvPicPr>
-              <a:picLocks noChangeAspect="1" noChangeArrowheads="1"/>
-            </p:cNvPicPr>
-            <p:nvPr/>
-          </p:nvPicPr>
-          <p:blipFill>
-            <a:blip r:embed="rId4" cstate="print">
-              <a:extLst>
-                <a:ext uri="{28A0092B-C50C-407E-A947-70E740481C1C}">
-                  <a14:useLocalDpi xmlns:a14="http://schemas.microsoft.com/office/drawing/2010/main" val="0"/>
-                </a:ext>
-              </a:extLst>
-            </a:blip>
-            <a:srcRect/>
-            <a:stretch>
-              <a:fillRect/>
-            </a:stretch>
-          </p:blipFill>
-          <p:spPr bwMode="auto">
-            <a:xfrm>
-              <a:off x="8912188" y="4428186"/>
-              <a:ext cx="643942" cy="360607"/>
-            </a:xfrm>
-            <a:prstGeom prst="rect">
-              <a:avLst/>
-            </a:prstGeom>
-            <a:noFill/>
-            <a:extLst>
-              <a:ext uri="{909E8E84-426E-40DD-AFC4-6F175D3DCCD1}">
-                <a14:hiddenFill xmlns:a14="http://schemas.microsoft.com/office/drawing/2010/main">
-                  <a:solidFill>
-                    <a:srgbClr val="FFFFFF"/>
-                  </a:solidFill>
-                </a14:hiddenFill>
-              </a:ext>
-            </a:extLst>
-          </p:spPr>
-        </p:pic>
-        <p:sp>
-          <p:nvSpPr>
-            <p:cNvPr id="36" name="ZoneTexte 35"/>
-            <p:cNvSpPr txBox="1"/>
-            <p:nvPr/>
-          </p:nvSpPr>
-          <p:spPr>
-            <a:xfrm>
-              <a:off x="9556130" y="4363617"/>
-              <a:ext cx="323093" cy="453085"/>
-            </a:xfrm>
-            <a:prstGeom prst="rect">
-              <a:avLst/>
-            </a:prstGeom>
-            <a:noFill/>
-          </p:spPr>
-          <p:txBody>
-            <a:bodyPr wrap="none" rtlCol="0">
-              <a:spAutoFit/>
-            </a:bodyPr>
-            <a:lstStyle/>
-            <a:p>
-              <a:r>
-                <a:rPr lang="fr-FR" sz="2646" dirty="0"/>
-                <a:t>5</a:t>
-              </a:r>
-            </a:p>
-          </p:txBody>
-        </p:sp>
-      </p:grpSp>
       <p:sp>
         <p:nvSpPr>
           <p:cNvPr id="45" name="Rectangle 44"/>
@@ -4176,14 +4043,14 @@
           <p:cNvPr id="47" name="Connecteur droit avec flèche 46"/>
           <p:cNvCxnSpPr>
             <a:stCxn id="28" idx="3"/>
-            <a:endCxn id="34" idx="2"/>
+            <a:endCxn id="66" idx="1"/>
           </p:cNvCxnSpPr>
           <p:nvPr/>
         </p:nvCxnSpPr>
         <p:spPr>
           <a:xfrm>
-            <a:off x="8073452" y="5808192"/>
-            <a:ext cx="1067059" cy="0"/>
+            <a:off x="8073453" y="5808192"/>
+            <a:ext cx="2527624" cy="931340"/>
           </a:xfrm>
           <a:prstGeom prst="straightConnector1">
             <a:avLst/>
@@ -4215,14 +4082,14 @@
           <p:cNvPr id="50" name="Connecteur droit avec flèche 49"/>
           <p:cNvCxnSpPr>
             <a:stCxn id="45" idx="3"/>
-            <a:endCxn id="34" idx="3"/>
+            <a:endCxn id="66" idx="2"/>
           </p:cNvCxnSpPr>
           <p:nvPr/>
         </p:nvCxnSpPr>
         <p:spPr>
-          <a:xfrm flipV="1">
-            <a:off x="8073452" y="6454204"/>
-            <a:ext cx="1741468" cy="931341"/>
+          <a:xfrm>
+            <a:off x="8073453" y="7385544"/>
+            <a:ext cx="1853216" cy="0"/>
           </a:xfrm>
           <a:prstGeom prst="straightConnector1">
             <a:avLst/>
@@ -4258,7 +4125,7 @@
           <p:nvPr/>
         </p:nvPicPr>
         <p:blipFill>
-          <a:blip r:embed="rId5" cstate="print">
+          <a:blip r:embed="rId4" cstate="print">
             <a:extLst>
               <a:ext uri="{28A0092B-C50C-407E-A947-70E740481C1C}">
                 <a14:useLocalDpi xmlns:a14="http://schemas.microsoft.com/office/drawing/2010/main" val="0"/>
@@ -4299,7 +4166,7 @@
           <p:nvPr/>
         </p:nvPicPr>
         <p:blipFill>
-          <a:blip r:embed="rId6"/>
+          <a:blip r:embed="rId5"/>
           <a:stretch>
             <a:fillRect/>
           </a:stretch>
@@ -4317,6 +4184,47 @@
       <p:pic>
         <p:nvPicPr>
           <p:cNvPr id="1042" name="Picture 18" descr="Résultat de recherche d'images pour &quot;reddit logo&quot;"/>
+          <p:cNvPicPr>
+            <a:picLocks noChangeAspect="1" noChangeArrowheads="1"/>
+          </p:cNvPicPr>
+          <p:nvPr/>
+        </p:nvPicPr>
+        <p:blipFill>
+          <a:blip r:embed="rId6" cstate="print">
+            <a:extLst>
+              <a:ext uri="{28A0092B-C50C-407E-A947-70E740481C1C}">
+                <a14:useLocalDpi xmlns:a14="http://schemas.microsoft.com/office/drawing/2010/main" val="0"/>
+              </a:ext>
+            </a:extLst>
+          </a:blip>
+          <a:srcRect/>
+          <a:stretch>
+            <a:fillRect/>
+          </a:stretch>
+        </p:blipFill>
+        <p:spPr bwMode="auto">
+          <a:xfrm>
+            <a:off x="3594999" y="1299413"/>
+            <a:ext cx="716417" cy="716417"/>
+          </a:xfrm>
+          <a:prstGeom prst="rect">
+            <a:avLst/>
+          </a:prstGeom>
+          <a:noFill/>
+          <a:extLst>
+            <a:ext uri="{909E8E84-426E-40DD-AFC4-6F175D3DCCD1}">
+              <a14:hiddenFill xmlns:a14="http://schemas.microsoft.com/office/drawing/2010/main">
+                <a:solidFill>
+                  <a:srgbClr val="FFFFFF"/>
+                </a:solidFill>
+              </a14:hiddenFill>
+            </a:ext>
+          </a:extLst>
+        </p:spPr>
+      </p:pic>
+      <p:pic>
+        <p:nvPicPr>
+          <p:cNvPr id="1044" name="Picture 20" descr="https://image.flaticon.com/icons/png/512/25/25231.png"/>
           <p:cNvPicPr>
             <a:picLocks noChangeAspect="1" noChangeArrowheads="1"/>
           </p:cNvPicPr>
@@ -4337,8 +4245,8 @@
         </p:blipFill>
         <p:spPr bwMode="auto">
           <a:xfrm>
-            <a:off x="3594999" y="1299413"/>
-            <a:ext cx="716417" cy="716417"/>
+            <a:off x="2156265" y="1390378"/>
+            <a:ext cx="534488" cy="534488"/>
           </a:xfrm>
           <a:prstGeom prst="rect">
             <a:avLst/>
@@ -4357,7 +4265,7 @@
       </p:pic>
       <p:pic>
         <p:nvPicPr>
-          <p:cNvPr id="1044" name="Picture 20" descr="https://image.flaticon.com/icons/png/512/25/25231.png"/>
+          <p:cNvPr id="1048" name="Picture 24" descr="Résultat de recherche d'images pour &quot;cryptocompare logo&quot;"/>
           <p:cNvPicPr>
             <a:picLocks noChangeAspect="1" noChangeArrowheads="1"/>
           </p:cNvPicPr>
@@ -4378,8 +4286,8 @@
         </p:blipFill>
         <p:spPr bwMode="auto">
           <a:xfrm>
-            <a:off x="2156265" y="1390378"/>
-            <a:ext cx="534488" cy="534488"/>
+            <a:off x="11436168" y="1446202"/>
+            <a:ext cx="591089" cy="591089"/>
           </a:xfrm>
           <a:prstGeom prst="rect">
             <a:avLst/>
@@ -4398,7 +4306,7 @@
       </p:pic>
       <p:pic>
         <p:nvPicPr>
-          <p:cNvPr id="1048" name="Picture 24" descr="Résultat de recherche d'images pour &quot;cryptocompare logo&quot;"/>
+          <p:cNvPr id="1054" name="Picture 30" descr="Résultat de recherche d'images pour &quot;coinmarketcap logo&quot;"/>
           <p:cNvPicPr>
             <a:picLocks noChangeAspect="1" noChangeArrowheads="1"/>
           </p:cNvPicPr>
@@ -4419,8 +4327,8 @@
         </p:blipFill>
         <p:spPr bwMode="auto">
           <a:xfrm>
-            <a:off x="11436168" y="1446202"/>
-            <a:ext cx="591089" cy="591089"/>
+            <a:off x="13154028" y="1430161"/>
+            <a:ext cx="508000" cy="508000"/>
           </a:xfrm>
           <a:prstGeom prst="rect">
             <a:avLst/>
@@ -4437,11 +4345,89 @@
           </a:extLst>
         </p:spPr>
       </p:pic>
+      <p:sp>
+        <p:nvSpPr>
+          <p:cNvPr id="49" name="ZoneTexte 48"/>
+          <p:cNvSpPr txBox="1"/>
+          <p:nvPr/>
+        </p:nvSpPr>
+        <p:spPr>
+          <a:xfrm>
+            <a:off x="6523326" y="3547905"/>
+            <a:ext cx="1632050" cy="448264"/>
+          </a:xfrm>
+          <a:prstGeom prst="rect">
+            <a:avLst/>
+          </a:prstGeom>
+          <a:noFill/>
+        </p:spPr>
+        <p:txBody>
+          <a:bodyPr wrap="none" rtlCol="0">
+            <a:spAutoFit/>
+          </a:bodyPr>
+          <a:lstStyle/>
+          <a:p>
+            <a:r>
+              <a:rPr lang="fr-FR" dirty="0" smtClean="0"/>
+              <a:t>REST / JSON</a:t>
+            </a:r>
+            <a:endParaRPr lang="fr-FR" dirty="0"/>
+          </a:p>
+        </p:txBody>
+      </p:sp>
+      <p:sp>
+        <p:nvSpPr>
+          <p:cNvPr id="66" name="Cylindre 65"/>
+          <p:cNvSpPr/>
+          <p:nvPr/>
+        </p:nvSpPr>
+        <p:spPr>
+          <a:xfrm>
+            <a:off x="9926669" y="6739532"/>
+            <a:ext cx="1348816" cy="1292023"/>
+          </a:xfrm>
+          <a:prstGeom prst="can">
+            <a:avLst/>
+          </a:prstGeom>
+        </p:spPr>
+        <p:style>
+          <a:lnRef idx="2">
+            <a:schemeClr val="accent1">
+              <a:shade val="50000"/>
+            </a:schemeClr>
+          </a:lnRef>
+          <a:fillRef idx="1">
+            <a:schemeClr val="accent1"/>
+          </a:fillRef>
+          <a:effectRef idx="0">
+            <a:schemeClr val="accent1"/>
+          </a:effectRef>
+          <a:fontRef idx="minor">
+            <a:schemeClr val="lt1"/>
+          </a:fontRef>
+        </p:style>
+        <p:txBody>
+          <a:bodyPr rot="0" spcFirstLastPara="0" vertOverflow="overflow" horzOverflow="overflow" vert="horz" wrap="square" lIns="100806" tIns="50403" rIns="100806" bIns="50403" numCol="1" spcCol="0" rtlCol="0" fromWordArt="0" anchor="ctr" anchorCtr="0" forceAA="0" compatLnSpc="1">
+            <a:prstTxWarp prst="textNoShape">
+              <a:avLst/>
+            </a:prstTxWarp>
+            <a:noAutofit/>
+          </a:bodyPr>
+          <a:lstStyle/>
+          <a:p>
+            <a:pPr algn="ctr"/>
+            <a:r>
+              <a:rPr lang="fr-FR" sz="2334" dirty="0"/>
+              <a:t>DB</a:t>
+            </a:r>
+          </a:p>
+        </p:txBody>
+      </p:sp>
       <p:pic>
         <p:nvPicPr>
-          <p:cNvPr id="1054" name="Picture 30" descr="Résultat de recherche d'images pour &quot;coinmarketcap logo&quot;"/>
+          <p:cNvPr id="56" name="Image 55"/>
           <p:cNvPicPr>
-            <a:picLocks noChangeAspect="1" noChangeArrowheads="1"/>
+            <a:picLocks noChangeAspect="1"/>
           </p:cNvPicPr>
           <p:nvPr/>
         </p:nvPicPr>
@@ -4453,112 +4439,23 @@
               </a:ext>
             </a:extLst>
           </a:blip>
-          <a:srcRect/>
           <a:stretch>
             <a:fillRect/>
           </a:stretch>
         </p:blipFill>
-        <p:spPr bwMode="auto">
-          <a:xfrm>
-            <a:off x="13154028" y="1430161"/>
-            <a:ext cx="508000" cy="508000"/>
+        <p:spPr>
+          <a:xfrm>
+            <a:off x="407688" y="6167136"/>
+            <a:ext cx="3834050" cy="2086942"/>
           </a:xfrm>
           <a:prstGeom prst="rect">
             <a:avLst/>
           </a:prstGeom>
-          <a:noFill/>
-          <a:extLst>
-            <a:ext uri="{909E8E84-426E-40DD-AFC4-6F175D3DCCD1}">
-              <a14:hiddenFill xmlns:a14="http://schemas.microsoft.com/office/drawing/2010/main">
-                <a:solidFill>
-                  <a:srgbClr val="FFFFFF"/>
-                </a:solidFill>
-              </a14:hiddenFill>
-            </a:ext>
-          </a:extLst>
         </p:spPr>
       </p:pic>
-      <p:sp>
-        <p:nvSpPr>
-          <p:cNvPr id="49" name="ZoneTexte 48"/>
-          <p:cNvSpPr txBox="1"/>
-          <p:nvPr/>
-        </p:nvSpPr>
-        <p:spPr>
-          <a:xfrm>
-            <a:off x="6523326" y="3547905"/>
-            <a:ext cx="1632050" cy="448264"/>
-          </a:xfrm>
-          <a:prstGeom prst="rect">
-            <a:avLst/>
-          </a:prstGeom>
-          <a:noFill/>
-        </p:spPr>
-        <p:txBody>
-          <a:bodyPr wrap="none" rtlCol="0">
-            <a:spAutoFit/>
-          </a:bodyPr>
-          <a:lstStyle/>
-          <a:p>
-            <a:r>
-              <a:rPr lang="fr-FR" dirty="0" smtClean="0"/>
-              <a:t>REST / JSON</a:t>
-            </a:r>
-            <a:endParaRPr lang="fr-FR" dirty="0"/>
-          </a:p>
-        </p:txBody>
-      </p:sp>
-      <p:sp>
-        <p:nvSpPr>
-          <p:cNvPr id="66" name="Cylindre 65"/>
-          <p:cNvSpPr/>
-          <p:nvPr/>
-        </p:nvSpPr>
-        <p:spPr>
-          <a:xfrm>
-            <a:off x="9310893" y="7807077"/>
-            <a:ext cx="1348816" cy="1292023"/>
-          </a:xfrm>
-          <a:prstGeom prst="can">
-            <a:avLst/>
-          </a:prstGeom>
-        </p:spPr>
-        <p:style>
-          <a:lnRef idx="2">
-            <a:schemeClr val="accent1">
-              <a:shade val="50000"/>
-            </a:schemeClr>
-          </a:lnRef>
-          <a:fillRef idx="1">
-            <a:schemeClr val="accent1"/>
-          </a:fillRef>
-          <a:effectRef idx="0">
-            <a:schemeClr val="accent1"/>
-          </a:effectRef>
-          <a:fontRef idx="minor">
-            <a:schemeClr val="lt1"/>
-          </a:fontRef>
-        </p:style>
-        <p:txBody>
-          <a:bodyPr rot="0" spcFirstLastPara="0" vertOverflow="overflow" horzOverflow="overflow" vert="horz" wrap="square" lIns="100806" tIns="50403" rIns="100806" bIns="50403" numCol="1" spcCol="0" rtlCol="0" fromWordArt="0" anchor="ctr" anchorCtr="0" forceAA="0" compatLnSpc="1">
-            <a:prstTxWarp prst="textNoShape">
-              <a:avLst/>
-            </a:prstTxWarp>
-            <a:noAutofit/>
-          </a:bodyPr>
-          <a:lstStyle/>
-          <a:p>
-            <a:pPr algn="ctr"/>
-            <a:r>
-              <a:rPr lang="fr-FR" sz="2334" dirty="0"/>
-              <a:t>DB</a:t>
-            </a:r>
-          </a:p>
-        </p:txBody>
-      </p:sp>
       <p:pic>
         <p:nvPicPr>
-          <p:cNvPr id="1056" name="Picture 32" descr="Résultat de recherche d'images pour &quot;mongodb logo svg&quot;"/>
+          <p:cNvPr id="1058" name="Picture 34" descr="Résultat de recherche d'images pour &quot;user svg icon&quot;"/>
           <p:cNvPicPr>
             <a:picLocks noChangeAspect="1" noChangeArrowheads="1"/>
           </p:cNvPicPr>
@@ -4579,8 +4476,8 @@
         </p:blipFill>
         <p:spPr bwMode="auto">
           <a:xfrm>
-            <a:off x="10304759" y="7544484"/>
-            <a:ext cx="688003" cy="746974"/>
+            <a:off x="288177" y="8521845"/>
+            <a:ext cx="631543" cy="647398"/>
           </a:xfrm>
           <a:prstGeom prst="rect">
             <a:avLst/>
@@ -4597,19 +4494,101 @@
           </a:extLst>
         </p:spPr>
       </p:pic>
+      <p:pic>
+        <p:nvPicPr>
+          <p:cNvPr id="77" name="Picture 34" descr="Résultat de recherche d'images pour &quot;user svg icon&quot;"/>
+          <p:cNvPicPr>
+            <a:picLocks noChangeAspect="1" noChangeArrowheads="1"/>
+          </p:cNvPicPr>
+          <p:nvPr/>
+        </p:nvPicPr>
+        <p:blipFill>
+          <a:blip r:embed="rId11" cstate="print">
+            <a:extLst>
+              <a:ext uri="{28A0092B-C50C-407E-A947-70E740481C1C}">
+                <a14:useLocalDpi xmlns:a14="http://schemas.microsoft.com/office/drawing/2010/main" val="0"/>
+              </a:ext>
+            </a:extLst>
+          </a:blip>
+          <a:srcRect/>
+          <a:stretch>
+            <a:fillRect/>
+          </a:stretch>
+        </p:blipFill>
+        <p:spPr bwMode="auto">
+          <a:xfrm>
+            <a:off x="855962" y="9060451"/>
+            <a:ext cx="631543" cy="647398"/>
+          </a:xfrm>
+          <a:prstGeom prst="rect">
+            <a:avLst/>
+          </a:prstGeom>
+          <a:noFill/>
+          <a:extLst>
+            <a:ext uri="{909E8E84-426E-40DD-AFC4-6F175D3DCCD1}">
+              <a14:hiddenFill xmlns:a14="http://schemas.microsoft.com/office/drawing/2010/main">
+                <a:solidFill>
+                  <a:srgbClr val="FFFFFF"/>
+                </a:solidFill>
+              </a14:hiddenFill>
+            </a:ext>
+          </a:extLst>
+        </p:spPr>
+      </p:pic>
+      <p:pic>
+        <p:nvPicPr>
+          <p:cNvPr id="78" name="Picture 34" descr="Résultat de recherche d'images pour &quot;user svg icon&quot;"/>
+          <p:cNvPicPr>
+            <a:picLocks noChangeAspect="1" noChangeArrowheads="1"/>
+          </p:cNvPicPr>
+          <p:nvPr/>
+        </p:nvPicPr>
+        <p:blipFill>
+          <a:blip r:embed="rId11" cstate="print">
+            <a:extLst>
+              <a:ext uri="{28A0092B-C50C-407E-A947-70E740481C1C}">
+                <a14:useLocalDpi xmlns:a14="http://schemas.microsoft.com/office/drawing/2010/main" val="0"/>
+              </a:ext>
+            </a:extLst>
+          </a:blip>
+          <a:srcRect/>
+          <a:stretch>
+            <a:fillRect/>
+          </a:stretch>
+        </p:blipFill>
+        <p:spPr bwMode="auto">
+          <a:xfrm>
+            <a:off x="249775" y="9228490"/>
+            <a:ext cx="631543" cy="647398"/>
+          </a:xfrm>
+          <a:prstGeom prst="rect">
+            <a:avLst/>
+          </a:prstGeom>
+          <a:noFill/>
+          <a:extLst>
+            <a:ext uri="{909E8E84-426E-40DD-AFC4-6F175D3DCCD1}">
+              <a14:hiddenFill xmlns:a14="http://schemas.microsoft.com/office/drawing/2010/main">
+                <a:solidFill>
+                  <a:srgbClr val="FFFFFF"/>
+                </a:solidFill>
+              </a14:hiddenFill>
+            </a:ext>
+          </a:extLst>
+        </p:spPr>
+      </p:pic>
       <p:cxnSp>
         <p:nvCxnSpPr>
-          <p:cNvPr id="68" name="Connecteur droit avec flèche 67"/>
+          <p:cNvPr id="79" name="Connecteur droit avec flèche 78"/>
           <p:cNvCxnSpPr>
-            <a:stCxn id="45" idx="3"/>
-            <a:endCxn id="66" idx="1"/>
+            <a:stCxn id="77" idx="3"/>
+            <a:endCxn id="51" idx="1"/>
           </p:cNvCxnSpPr>
           <p:nvPr/>
         </p:nvCxnSpPr>
         <p:spPr>
-          <a:xfrm>
-            <a:off x="8073453" y="7385544"/>
-            <a:ext cx="1911848" cy="421533"/>
+          <a:xfrm flipV="1">
+            <a:off x="1487505" y="8665674"/>
+            <a:ext cx="1636169" cy="718476"/>
           </a:xfrm>
           <a:prstGeom prst="straightConnector1">
             <a:avLst/>
@@ -4636,11 +4615,178 @@
           </a:fontRef>
         </p:style>
       </p:cxnSp>
+      <p:cxnSp>
+        <p:nvCxnSpPr>
+          <p:cNvPr id="87" name="Connecteur droit avec flèche 86"/>
+          <p:cNvCxnSpPr>
+            <a:stCxn id="51" idx="3"/>
+            <a:endCxn id="58" idx="1"/>
+          </p:cNvCxnSpPr>
+          <p:nvPr/>
+        </p:nvCxnSpPr>
+        <p:spPr>
+          <a:xfrm>
+            <a:off x="4737852" y="8665674"/>
+            <a:ext cx="1721422" cy="562816"/>
+          </a:xfrm>
+          <a:prstGeom prst="straightConnector1">
+            <a:avLst/>
+          </a:prstGeom>
+          <a:ln w="6350">
+            <a:solidFill>
+              <a:schemeClr val="tx1"/>
+            </a:solidFill>
+            <a:tailEnd type="triangle"/>
+          </a:ln>
+        </p:spPr>
+        <p:style>
+          <a:lnRef idx="1">
+            <a:schemeClr val="accent1"/>
+          </a:lnRef>
+          <a:fillRef idx="0">
+            <a:schemeClr val="accent1"/>
+          </a:fillRef>
+          <a:effectRef idx="0">
+            <a:schemeClr val="accent1"/>
+          </a:effectRef>
+          <a:fontRef idx="minor">
+            <a:schemeClr val="tx1"/>
+          </a:fontRef>
+        </p:style>
+      </p:cxnSp>
+      <p:cxnSp>
+        <p:nvCxnSpPr>
+          <p:cNvPr id="93" name="Connecteur droit avec flèche 92"/>
+          <p:cNvCxnSpPr/>
+          <p:nvPr/>
+        </p:nvCxnSpPr>
+        <p:spPr>
+          <a:xfrm flipV="1">
+            <a:off x="12451175" y="14686052"/>
+            <a:ext cx="467136" cy="191367"/>
+          </a:xfrm>
+          <a:prstGeom prst="straightConnector1">
+            <a:avLst/>
+          </a:prstGeom>
+          <a:ln w="6350">
+            <a:solidFill>
+              <a:schemeClr val="tx1"/>
+            </a:solidFill>
+            <a:tailEnd type="triangle"/>
+          </a:ln>
+        </p:spPr>
+        <p:style>
+          <a:lnRef idx="1">
+            <a:schemeClr val="accent1"/>
+          </a:lnRef>
+          <a:fillRef idx="0">
+            <a:schemeClr val="accent1"/>
+          </a:fillRef>
+          <a:effectRef idx="0">
+            <a:schemeClr val="accent1"/>
+          </a:effectRef>
+          <a:fontRef idx="minor">
+            <a:schemeClr val="tx1"/>
+          </a:fontRef>
+        </p:style>
+      </p:cxnSp>
+      <p:cxnSp>
+        <p:nvCxnSpPr>
+          <p:cNvPr id="103" name="Connecteur droit avec flèche 102"/>
+          <p:cNvCxnSpPr>
+            <a:stCxn id="58" idx="3"/>
+            <a:endCxn id="66" idx="3"/>
+          </p:cNvCxnSpPr>
+          <p:nvPr/>
+        </p:nvCxnSpPr>
+        <p:spPr>
+          <a:xfrm flipV="1">
+            <a:off x="8073452" y="8031555"/>
+            <a:ext cx="2527625" cy="1196935"/>
+          </a:xfrm>
+          <a:prstGeom prst="straightConnector1">
+            <a:avLst/>
+          </a:prstGeom>
+          <a:ln w="6350">
+            <a:solidFill>
+              <a:schemeClr val="tx1"/>
+            </a:solidFill>
+            <a:tailEnd type="triangle"/>
+          </a:ln>
+        </p:spPr>
+        <p:style>
+          <a:lnRef idx="1">
+            <a:schemeClr val="accent1"/>
+          </a:lnRef>
+          <a:fillRef idx="0">
+            <a:schemeClr val="accent1"/>
+          </a:fillRef>
+          <a:effectRef idx="0">
+            <a:schemeClr val="accent1"/>
+          </a:effectRef>
+          <a:fontRef idx="minor">
+            <a:schemeClr val="tx1"/>
+          </a:fontRef>
+        </p:style>
+      </p:cxnSp>
+      <p:sp>
+        <p:nvSpPr>
+          <p:cNvPr id="51" name="Rectangle 50"/>
+          <p:cNvSpPr/>
+          <p:nvPr/>
+        </p:nvSpPr>
+        <p:spPr>
+          <a:xfrm>
+            <a:off x="3123674" y="8133247"/>
+            <a:ext cx="1614178" cy="1064854"/>
+          </a:xfrm>
+          <a:prstGeom prst="rect">
+            <a:avLst/>
+          </a:prstGeom>
+        </p:spPr>
+        <p:style>
+          <a:lnRef idx="2">
+            <a:schemeClr val="accent1">
+              <a:shade val="50000"/>
+            </a:schemeClr>
+          </a:lnRef>
+          <a:fillRef idx="1">
+            <a:schemeClr val="accent1"/>
+          </a:fillRef>
+          <a:effectRef idx="0">
+            <a:schemeClr val="accent1"/>
+          </a:effectRef>
+          <a:fontRef idx="minor">
+            <a:schemeClr val="lt1"/>
+          </a:fontRef>
+        </p:style>
+        <p:txBody>
+          <a:bodyPr rot="0" spcFirstLastPara="0" vertOverflow="overflow" horzOverflow="overflow" vert="horz" wrap="square" lIns="100806" tIns="50403" rIns="100806" bIns="50403" numCol="1" spcCol="0" rtlCol="0" fromWordArt="0" anchor="ctr" anchorCtr="0" forceAA="0" compatLnSpc="1">
+            <a:prstTxWarp prst="textNoShape">
+              <a:avLst/>
+            </a:prstTxWarp>
+            <a:noAutofit/>
+          </a:bodyPr>
+          <a:lstStyle/>
+          <a:p>
+            <a:pPr algn="ctr"/>
+            <a:r>
+              <a:rPr lang="fr-FR" sz="2334" dirty="0" err="1" smtClean="0"/>
+              <a:t>Fronting</a:t>
+            </a:r>
+            <a:r>
+              <a:rPr lang="fr-FR" sz="2334" dirty="0" smtClean="0"/>
+              <a:t> Web</a:t>
+            </a:r>
+            <a:endParaRPr lang="fr-FR" sz="2334" dirty="0"/>
+          </a:p>
+        </p:txBody>
+      </p:sp>
       <p:pic>
         <p:nvPicPr>
-          <p:cNvPr id="56" name="Image 55"/>
+          <p:cNvPr id="1060" name="Picture 36" descr="Résultat de recherche d'images pour &quot;angular logo&quot;"/>
           <p:cNvPicPr>
-            <a:picLocks noChangeAspect="1"/>
+            <a:picLocks noChangeAspect="1" noChangeArrowheads="1"/>
           </p:cNvPicPr>
           <p:nvPr/>
         </p:nvPicPr>
@@ -4652,23 +4798,83 @@
               </a:ext>
             </a:extLst>
           </a:blip>
+          <a:srcRect/>
           <a:stretch>
             <a:fillRect/>
           </a:stretch>
         </p:blipFill>
-        <p:spPr>
-          <a:xfrm>
-            <a:off x="407688" y="6167136"/>
-            <a:ext cx="3834050" cy="2086942"/>
+        <p:spPr bwMode="auto">
+          <a:xfrm>
+            <a:off x="4331656" y="7707103"/>
+            <a:ext cx="778803" cy="778803"/>
           </a:xfrm>
           <a:prstGeom prst="rect">
             <a:avLst/>
           </a:prstGeom>
+          <a:noFill/>
+          <a:extLst>
+            <a:ext uri="{909E8E84-426E-40DD-AFC4-6F175D3DCCD1}">
+              <a14:hiddenFill xmlns:a14="http://schemas.microsoft.com/office/drawing/2010/main">
+                <a:solidFill>
+                  <a:srgbClr val="FFFFFF"/>
+                </a:solidFill>
+              </a14:hiddenFill>
+            </a:ext>
+          </a:extLst>
         </p:spPr>
       </p:pic>
+      <p:sp>
+        <p:nvSpPr>
+          <p:cNvPr id="58" name="Rectangle 57"/>
+          <p:cNvSpPr/>
+          <p:nvPr/>
+        </p:nvSpPr>
+        <p:spPr>
+          <a:xfrm>
+            <a:off x="6459274" y="8696063"/>
+            <a:ext cx="1614178" cy="1064854"/>
+          </a:xfrm>
+          <a:prstGeom prst="rect">
+            <a:avLst/>
+          </a:prstGeom>
+        </p:spPr>
+        <p:style>
+          <a:lnRef idx="2">
+            <a:schemeClr val="accent1">
+              <a:shade val="50000"/>
+            </a:schemeClr>
+          </a:lnRef>
+          <a:fillRef idx="1">
+            <a:schemeClr val="accent1"/>
+          </a:fillRef>
+          <a:effectRef idx="0">
+            <a:schemeClr val="accent1"/>
+          </a:effectRef>
+          <a:fontRef idx="minor">
+            <a:schemeClr val="lt1"/>
+          </a:fontRef>
+        </p:style>
+        <p:txBody>
+          <a:bodyPr rot="0" spcFirstLastPara="0" vertOverflow="overflow" horzOverflow="overflow" vert="horz" wrap="square" lIns="100806" tIns="50403" rIns="100806" bIns="50403" numCol="1" spcCol="0" rtlCol="0" fromWordArt="0" anchor="ctr" anchorCtr="0" forceAA="0" compatLnSpc="1">
+            <a:prstTxWarp prst="textNoShape">
+              <a:avLst/>
+            </a:prstTxWarp>
+            <a:noAutofit/>
+          </a:bodyPr>
+          <a:lstStyle/>
+          <a:p>
+            <a:pPr algn="ctr"/>
+            <a:r>
+              <a:rPr lang="fr-FR" sz="2334" dirty="0" err="1" smtClean="0"/>
+              <a:t>APINode</a:t>
+            </a:r>
+            <a:endParaRPr lang="fr-FR" sz="2334" dirty="0"/>
+          </a:p>
+        </p:txBody>
+      </p:sp>
       <p:pic>
         <p:nvPicPr>
-          <p:cNvPr id="1058" name="Picture 34" descr="Résultat de recherche d'images pour &quot;user svg icon&quot;"/>
+          <p:cNvPr id="1062" name="Picture 38" descr="Résultat de recherche d'images pour &quot;nodejs logo&quot;"/>
           <p:cNvPicPr>
             <a:picLocks noChangeAspect="1" noChangeArrowheads="1"/>
           </p:cNvPicPr>
@@ -4689,8 +4895,8 @@
         </p:blipFill>
         <p:spPr bwMode="auto">
           <a:xfrm>
-            <a:off x="288177" y="8521845"/>
-            <a:ext cx="631543" cy="647398"/>
+            <a:off x="7750344" y="8563983"/>
+            <a:ext cx="753460" cy="461561"/>
           </a:xfrm>
           <a:prstGeom prst="rect">
             <a:avLst/>
@@ -4707,31 +4913,18 @@
           </a:extLst>
         </p:spPr>
       </p:pic>
-      <p:pic>
-        <p:nvPicPr>
-          <p:cNvPr id="77" name="Picture 34" descr="Résultat de recherche d'images pour &quot;user svg icon&quot;"/>
-          <p:cNvPicPr>
-            <a:picLocks noChangeAspect="1" noChangeArrowheads="1"/>
-          </p:cNvPicPr>
+      <p:sp>
+        <p:nvSpPr>
+          <p:cNvPr id="9" name="AutoShape 2" descr="Résultat de recherche d'images pour &quot;postgresql&quot;"/>
+          <p:cNvSpPr>
+            <a:spLocks noChangeAspect="1" noChangeArrowheads="1"/>
+          </p:cNvSpPr>
           <p:nvPr/>
-        </p:nvPicPr>
-        <p:blipFill>
-          <a:blip r:embed="rId13" cstate="print">
-            <a:extLst>
-              <a:ext uri="{28A0092B-C50C-407E-A947-70E740481C1C}">
-                <a14:useLocalDpi xmlns:a14="http://schemas.microsoft.com/office/drawing/2010/main" val="0"/>
-              </a:ext>
-            </a:extLst>
-          </a:blip>
-          <a:srcRect/>
-          <a:stretch>
-            <a:fillRect/>
-          </a:stretch>
-        </p:blipFill>
+        </p:nvSpPr>
         <p:spPr bwMode="auto">
           <a:xfrm>
-            <a:off x="855962" y="9060451"/>
-            <a:ext cx="631543" cy="647398"/>
+            <a:off x="510967" y="850903"/>
+            <a:ext cx="45719" cy="45719"/>
           </a:xfrm>
           <a:prstGeom prst="rect">
             <a:avLst/>
@@ -4747,385 +4940,104 @@
             </a:ext>
           </a:extLst>
         </p:spPr>
-      </p:pic>
-      <p:pic>
-        <p:nvPicPr>
-          <p:cNvPr id="78" name="Picture 34" descr="Résultat de recherche d'images pour &quot;user svg icon&quot;"/>
-          <p:cNvPicPr>
-            <a:picLocks noChangeAspect="1" noChangeArrowheads="1"/>
-          </p:cNvPicPr>
-          <p:nvPr/>
-        </p:nvPicPr>
-        <p:blipFill>
-          <a:blip r:embed="rId13" cstate="print">
-            <a:extLst>
-              <a:ext uri="{28A0092B-C50C-407E-A947-70E740481C1C}">
-                <a14:useLocalDpi xmlns:a14="http://schemas.microsoft.com/office/drawing/2010/main" val="0"/>
-              </a:ext>
-            </a:extLst>
-          </a:blip>
-          <a:srcRect/>
-          <a:stretch>
-            <a:fillRect/>
-          </a:stretch>
-        </p:blipFill>
-        <p:spPr bwMode="auto">
-          <a:xfrm>
-            <a:off x="249775" y="9228490"/>
-            <a:ext cx="631543" cy="647398"/>
-          </a:xfrm>
-          <a:prstGeom prst="rect">
-            <a:avLst/>
-          </a:prstGeom>
-          <a:noFill/>
-          <a:extLst>
-            <a:ext uri="{909E8E84-426E-40DD-AFC4-6F175D3DCCD1}">
-              <a14:hiddenFill xmlns:a14="http://schemas.microsoft.com/office/drawing/2010/main">
-                <a:solidFill>
-                  <a:srgbClr val="FFFFFF"/>
-                </a:solidFill>
-              </a14:hiddenFill>
-            </a:ext>
-          </a:extLst>
-        </p:spPr>
-      </p:pic>
-      <p:cxnSp>
-        <p:nvCxnSpPr>
-          <p:cNvPr id="79" name="Connecteur droit avec flèche 78"/>
-          <p:cNvCxnSpPr>
-            <a:stCxn id="77" idx="3"/>
-            <a:endCxn id="51" idx="1"/>
-          </p:cNvCxnSpPr>
-          <p:nvPr/>
-        </p:nvCxnSpPr>
-        <p:spPr>
-          <a:xfrm flipV="1">
-            <a:off x="1487505" y="8665674"/>
-            <a:ext cx="1636169" cy="718476"/>
-          </a:xfrm>
-          <a:prstGeom prst="straightConnector1">
-            <a:avLst/>
-          </a:prstGeom>
-          <a:ln w="6350">
-            <a:solidFill>
-              <a:schemeClr val="tx1"/>
-            </a:solidFill>
-            <a:tailEnd type="triangle"/>
-          </a:ln>
-        </p:spPr>
-        <p:style>
-          <a:lnRef idx="1">
-            <a:schemeClr val="accent1"/>
-          </a:lnRef>
-          <a:fillRef idx="0">
-            <a:schemeClr val="accent1"/>
-          </a:fillRef>
-          <a:effectRef idx="0">
-            <a:schemeClr val="accent1"/>
-          </a:effectRef>
-          <a:fontRef idx="minor">
-            <a:schemeClr val="tx1"/>
-          </a:fontRef>
-        </p:style>
-      </p:cxnSp>
-      <p:cxnSp>
-        <p:nvCxnSpPr>
-          <p:cNvPr id="87" name="Connecteur droit avec flèche 86"/>
-          <p:cNvCxnSpPr>
-            <a:stCxn id="51" idx="3"/>
-            <a:endCxn id="58" idx="1"/>
-          </p:cNvCxnSpPr>
-          <p:nvPr/>
-        </p:nvCxnSpPr>
-        <p:spPr>
-          <a:xfrm>
-            <a:off x="4737852" y="8665674"/>
-            <a:ext cx="1721422" cy="562816"/>
-          </a:xfrm>
-          <a:prstGeom prst="straightConnector1">
-            <a:avLst/>
-          </a:prstGeom>
-          <a:ln w="6350">
-            <a:solidFill>
-              <a:schemeClr val="tx1"/>
-            </a:solidFill>
-            <a:tailEnd type="triangle"/>
-          </a:ln>
-        </p:spPr>
-        <p:style>
-          <a:lnRef idx="1">
-            <a:schemeClr val="accent1"/>
-          </a:lnRef>
-          <a:fillRef idx="0">
-            <a:schemeClr val="accent1"/>
-          </a:fillRef>
-          <a:effectRef idx="0">
-            <a:schemeClr val="accent1"/>
-          </a:effectRef>
-          <a:fontRef idx="minor">
-            <a:schemeClr val="tx1"/>
-          </a:fontRef>
-        </p:style>
-      </p:cxnSp>
-      <p:cxnSp>
-        <p:nvCxnSpPr>
-          <p:cNvPr id="93" name="Connecteur droit avec flèche 92"/>
-          <p:cNvCxnSpPr/>
-          <p:nvPr/>
-        </p:nvCxnSpPr>
-        <p:spPr>
-          <a:xfrm flipV="1">
-            <a:off x="12451175" y="14686052"/>
-            <a:ext cx="467136" cy="191367"/>
-          </a:xfrm>
-          <a:prstGeom prst="straightConnector1">
-            <a:avLst/>
-          </a:prstGeom>
-          <a:ln w="6350">
-            <a:solidFill>
-              <a:schemeClr val="tx1"/>
-            </a:solidFill>
-            <a:tailEnd type="triangle"/>
-          </a:ln>
-        </p:spPr>
-        <p:style>
-          <a:lnRef idx="1">
-            <a:schemeClr val="accent1"/>
-          </a:lnRef>
-          <a:fillRef idx="0">
-            <a:schemeClr val="accent1"/>
-          </a:fillRef>
-          <a:effectRef idx="0">
-            <a:schemeClr val="accent1"/>
-          </a:effectRef>
-          <a:fontRef idx="minor">
-            <a:schemeClr val="tx1"/>
-          </a:fontRef>
-        </p:style>
-      </p:cxnSp>
-      <p:cxnSp>
-        <p:nvCxnSpPr>
-          <p:cNvPr id="103" name="Connecteur droit avec flèche 102"/>
-          <p:cNvCxnSpPr>
-            <a:stCxn id="58" idx="3"/>
-            <a:endCxn id="66" idx="2"/>
-          </p:cNvCxnSpPr>
-          <p:nvPr/>
-        </p:nvCxnSpPr>
-        <p:spPr>
-          <a:xfrm flipV="1">
-            <a:off x="8073452" y="8453089"/>
-            <a:ext cx="1237441" cy="775401"/>
-          </a:xfrm>
-          <a:prstGeom prst="straightConnector1">
-            <a:avLst/>
-          </a:prstGeom>
-          <a:ln w="6350">
-            <a:solidFill>
-              <a:schemeClr val="tx1"/>
-            </a:solidFill>
-            <a:tailEnd type="triangle"/>
-          </a:ln>
-        </p:spPr>
-        <p:style>
-          <a:lnRef idx="1">
-            <a:schemeClr val="accent1"/>
-          </a:lnRef>
-          <a:fillRef idx="0">
-            <a:schemeClr val="accent1"/>
-          </a:fillRef>
-          <a:effectRef idx="0">
-            <a:schemeClr val="accent1"/>
-          </a:effectRef>
-          <a:fontRef idx="minor">
-            <a:schemeClr val="tx1"/>
-          </a:fontRef>
-        </p:style>
-      </p:cxnSp>
-      <p:sp>
-        <p:nvSpPr>
-          <p:cNvPr id="51" name="Rectangle 50"/>
-          <p:cNvSpPr/>
-          <p:nvPr/>
-        </p:nvSpPr>
-        <p:spPr>
-          <a:xfrm>
-            <a:off x="3123674" y="8133247"/>
-            <a:ext cx="1614178" cy="1064854"/>
-          </a:xfrm>
-          <a:prstGeom prst="rect">
-            <a:avLst/>
-          </a:prstGeom>
-        </p:spPr>
-        <p:style>
-          <a:lnRef idx="2">
-            <a:schemeClr val="accent1">
-              <a:shade val="50000"/>
-            </a:schemeClr>
-          </a:lnRef>
-          <a:fillRef idx="1">
-            <a:schemeClr val="accent1"/>
-          </a:fillRef>
-          <a:effectRef idx="0">
-            <a:schemeClr val="accent1"/>
-          </a:effectRef>
-          <a:fontRef idx="minor">
-            <a:schemeClr val="lt1"/>
-          </a:fontRef>
-        </p:style>
-        <p:txBody>
-          <a:bodyPr rot="0" spcFirstLastPara="0" vertOverflow="overflow" horzOverflow="overflow" vert="horz" wrap="square" lIns="100806" tIns="50403" rIns="100806" bIns="50403" numCol="1" spcCol="0" rtlCol="0" fromWordArt="0" anchor="ctr" anchorCtr="0" forceAA="0" compatLnSpc="1">
+        <p:txBody>
+          <a:bodyPr vert="horz" wrap="square" lIns="91440" tIns="45720" rIns="91440" bIns="45720" numCol="1" anchor="t" anchorCtr="0" compatLnSpc="1">
             <a:prstTxWarp prst="textNoShape">
               <a:avLst/>
             </a:prstTxWarp>
-            <a:noAutofit/>
           </a:bodyPr>
           <a:lstStyle/>
           <a:p>
-            <a:pPr algn="ctr"/>
-            <a:r>
-              <a:rPr lang="fr-FR" sz="2334" dirty="0" err="1" smtClean="0"/>
-              <a:t>Fronting</a:t>
-            </a:r>
-            <a:r>
-              <a:rPr lang="fr-FR" sz="2334" dirty="0" smtClean="0"/>
-              <a:t> Web</a:t>
-            </a:r>
-            <a:endParaRPr lang="fr-FR" sz="2334" dirty="0"/>
-          </a:p>
-        </p:txBody>
-      </p:sp>
-      <p:pic>
-        <p:nvPicPr>
-          <p:cNvPr id="1060" name="Picture 36" descr="Résultat de recherche d'images pour &quot;angular logo&quot;"/>
-          <p:cNvPicPr>
-            <a:picLocks noChangeAspect="1" noChangeArrowheads="1"/>
-          </p:cNvPicPr>
+            <a:endParaRPr lang="fr-FR"/>
+          </a:p>
+        </p:txBody>
+      </p:sp>
+      <p:grpSp>
+        <p:nvGrpSpPr>
+          <p:cNvPr id="18" name="Groupe 17"/>
+          <p:cNvGrpSpPr/>
           <p:nvPr/>
-        </p:nvPicPr>
-        <p:blipFill>
-          <a:blip r:embed="rId14" cstate="print">
+        </p:nvGrpSpPr>
+        <p:grpSpPr>
+          <a:xfrm>
+            <a:off x="10731349" y="6171342"/>
+            <a:ext cx="1129348" cy="1040032"/>
+            <a:chOff x="10731349" y="6171342"/>
+            <a:chExt cx="1129348" cy="1040032"/>
+          </a:xfrm>
+        </p:grpSpPr>
+        <p:pic>
+          <p:nvPicPr>
+            <p:cNvPr id="1028" name="Picture 4" descr="Résultat de recherche d'images pour &quot;postgresql&quot;"/>
+            <p:cNvPicPr>
+              <a:picLocks noChangeAspect="1" noChangeArrowheads="1"/>
+            </p:cNvPicPr>
+            <p:nvPr/>
+          </p:nvPicPr>
+          <p:blipFill>
+            <a:blip r:embed="rId14" cstate="print">
+              <a:extLst>
+                <a:ext uri="{28A0092B-C50C-407E-A947-70E740481C1C}">
+                  <a14:useLocalDpi xmlns:a14="http://schemas.microsoft.com/office/drawing/2010/main" val="0"/>
+                </a:ext>
+              </a:extLst>
+            </a:blip>
+            <a:srcRect/>
+            <a:stretch>
+              <a:fillRect/>
+            </a:stretch>
+          </p:blipFill>
+          <p:spPr bwMode="auto">
+            <a:xfrm>
+              <a:off x="10900257" y="6526566"/>
+              <a:ext cx="663788" cy="684808"/>
+            </a:xfrm>
+            <a:prstGeom prst="rect">
+              <a:avLst/>
+            </a:prstGeom>
+            <a:noFill/>
             <a:extLst>
-              <a:ext uri="{28A0092B-C50C-407E-A947-70E740481C1C}">
-                <a14:useLocalDpi xmlns:a14="http://schemas.microsoft.com/office/drawing/2010/main" val="0"/>
+              <a:ext uri="{909E8E84-426E-40DD-AFC4-6F175D3DCCD1}">
+                <a14:hiddenFill xmlns:a14="http://schemas.microsoft.com/office/drawing/2010/main">
+                  <a:solidFill>
+                    <a:srgbClr val="FFFFFF"/>
+                  </a:solidFill>
+                </a14:hiddenFill>
               </a:ext>
             </a:extLst>
-          </a:blip>
-          <a:srcRect/>
-          <a:stretch>
-            <a:fillRect/>
-          </a:stretch>
-        </p:blipFill>
-        <p:spPr bwMode="auto">
-          <a:xfrm>
-            <a:off x="4331656" y="7707103"/>
-            <a:ext cx="778803" cy="778803"/>
-          </a:xfrm>
-          <a:prstGeom prst="rect">
-            <a:avLst/>
-          </a:prstGeom>
-          <a:noFill/>
-          <a:extLst>
-            <a:ext uri="{909E8E84-426E-40DD-AFC4-6F175D3DCCD1}">
-              <a14:hiddenFill xmlns:a14="http://schemas.microsoft.com/office/drawing/2010/main">
-                <a:solidFill>
-                  <a:srgbClr val="FFFFFF"/>
-                </a:solidFill>
-              </a14:hiddenFill>
-            </a:ext>
-          </a:extLst>
-        </p:spPr>
-      </p:pic>
-      <p:sp>
-        <p:nvSpPr>
-          <p:cNvPr id="58" name="Rectangle 57"/>
-          <p:cNvSpPr/>
-          <p:nvPr/>
-        </p:nvSpPr>
-        <p:spPr>
-          <a:xfrm>
-            <a:off x="6459274" y="8696063"/>
-            <a:ext cx="1614178" cy="1064854"/>
-          </a:xfrm>
-          <a:prstGeom prst="rect">
-            <a:avLst/>
-          </a:prstGeom>
-        </p:spPr>
-        <p:style>
-          <a:lnRef idx="2">
-            <a:schemeClr val="accent1">
-              <a:shade val="50000"/>
-            </a:schemeClr>
-          </a:lnRef>
-          <a:fillRef idx="1">
-            <a:schemeClr val="accent1"/>
-          </a:fillRef>
-          <a:effectRef idx="0">
-            <a:schemeClr val="accent1"/>
-          </a:effectRef>
-          <a:fontRef idx="minor">
-            <a:schemeClr val="lt1"/>
-          </a:fontRef>
-        </p:style>
-        <p:txBody>
-          <a:bodyPr rot="0" spcFirstLastPara="0" vertOverflow="overflow" horzOverflow="overflow" vert="horz" wrap="square" lIns="100806" tIns="50403" rIns="100806" bIns="50403" numCol="1" spcCol="0" rtlCol="0" fromWordArt="0" anchor="ctr" anchorCtr="0" forceAA="0" compatLnSpc="1">
-            <a:prstTxWarp prst="textNoShape">
+          </p:spPr>
+        </p:pic>
+        <p:sp>
+          <p:nvSpPr>
+            <p:cNvPr id="62" name="ZoneTexte 61"/>
+            <p:cNvSpPr txBox="1"/>
+            <p:nvPr/>
+          </p:nvSpPr>
+          <p:spPr>
+            <a:xfrm>
+              <a:off x="10731349" y="6171342"/>
+              <a:ext cx="1129348" cy="338554"/>
+            </a:xfrm>
+            <a:prstGeom prst="rect">
               <a:avLst/>
-            </a:prstTxWarp>
-            <a:noAutofit/>
-          </a:bodyPr>
-          <a:lstStyle/>
-          <a:p>
-            <a:pPr algn="ctr"/>
-            <a:r>
-              <a:rPr lang="fr-FR" sz="2334" dirty="0" err="1" smtClean="0"/>
-              <a:t>APINode</a:t>
-            </a:r>
-            <a:endParaRPr lang="fr-FR" sz="2334" dirty="0"/>
-          </a:p>
-        </p:txBody>
-      </p:sp>
-      <p:pic>
-        <p:nvPicPr>
-          <p:cNvPr id="1062" name="Picture 38" descr="Résultat de recherche d'images pour &quot;nodejs logo&quot;"/>
-          <p:cNvPicPr>
-            <a:picLocks noChangeAspect="1" noChangeArrowheads="1"/>
-          </p:cNvPicPr>
-          <p:nvPr/>
-        </p:nvPicPr>
-        <p:blipFill>
-          <a:blip r:embed="rId15" cstate="print">
-            <a:extLst>
-              <a:ext uri="{28A0092B-C50C-407E-A947-70E740481C1C}">
-                <a14:useLocalDpi xmlns:a14="http://schemas.microsoft.com/office/drawing/2010/main" val="0"/>
-              </a:ext>
-            </a:extLst>
-          </a:blip>
-          <a:srcRect/>
-          <a:stretch>
-            <a:fillRect/>
-          </a:stretch>
-        </p:blipFill>
-        <p:spPr bwMode="auto">
-          <a:xfrm>
-            <a:off x="7750344" y="8563983"/>
-            <a:ext cx="753460" cy="461561"/>
-          </a:xfrm>
-          <a:prstGeom prst="rect">
-            <a:avLst/>
-          </a:prstGeom>
-          <a:noFill/>
-          <a:extLst>
-            <a:ext uri="{909E8E84-426E-40DD-AFC4-6F175D3DCCD1}">
-              <a14:hiddenFill xmlns:a14="http://schemas.microsoft.com/office/drawing/2010/main">
-                <a:solidFill>
-                  <a:srgbClr val="FFFFFF"/>
-                </a:solidFill>
-              </a14:hiddenFill>
-            </a:ext>
-          </a:extLst>
-        </p:spPr>
-      </p:pic>
+            </a:prstGeom>
+            <a:noFill/>
+          </p:spPr>
+          <p:txBody>
+            <a:bodyPr wrap="none" rtlCol="0">
+              <a:spAutoFit/>
+            </a:bodyPr>
+            <a:lstStyle/>
+            <a:p>
+              <a:r>
+                <a:rPr lang="fr-FR" sz="1600" dirty="0" smtClean="0"/>
+                <a:t>PostgreSQL</a:t>
+              </a:r>
+              <a:endParaRPr lang="fr-FR" sz="1600" dirty="0"/>
+            </a:p>
+          </p:txBody>
+        </p:sp>
+      </p:grpSp>
     </p:spTree>
     <p:extLst>
       <p:ext uri="{BB962C8B-B14F-4D97-AF65-F5344CB8AC3E}">

</xml_diff>